<commit_message>
refactor architacture (main refactor)
</commit_message>
<xml_diff>
--- a/graphics/architecture.pptx
+++ b/graphics/architecture.pptx
@@ -8,6 +8,9 @@
     <p:sldId id="256" r:id="rId2"/>
     <p:sldId id="257" r:id="rId3"/>
     <p:sldId id="258" r:id="rId4"/>
+    <p:sldId id="259" r:id="rId5"/>
+    <p:sldId id="260" r:id="rId6"/>
+    <p:sldId id="261" r:id="rId7"/>
   </p:sldIdLst>
   <p:sldSz cx="12192000" cy="6858000"/>
   <p:notesSz cx="6858000" cy="9144000"/>
@@ -106,6 +109,11 @@
       </a:defRPr>
     </a:lvl9pPr>
   </p:defaultTextStyle>
+  <p:extLst>
+    <p:ext uri="{EFAFB233-063F-42B5-8137-9DF3F51BA10A}">
+      <p15:sldGuideLst xmlns:p15="http://schemas.microsoft.com/office/powerpoint/2012/main"/>
+    </p:ext>
+  </p:extLst>
 </p:presentation>
 </file>
 
@@ -258,7 +266,7 @@
           <a:p>
             <a:fld id="{FE7AE501-5CD4-1C49-8470-38355E08846F}" type="datetimeFigureOut">
               <a:rPr lang="en-DE" smtClean="0"/>
-              <a:t>20.04.23</a:t>
+              <a:t>09.06.23</a:t>
             </a:fld>
             <a:endParaRPr lang="en-DE"/>
           </a:p>
@@ -458,7 +466,7 @@
           <a:p>
             <a:fld id="{FE7AE501-5CD4-1C49-8470-38355E08846F}" type="datetimeFigureOut">
               <a:rPr lang="en-DE" smtClean="0"/>
-              <a:t>20.04.23</a:t>
+              <a:t>09.06.23</a:t>
             </a:fld>
             <a:endParaRPr lang="en-DE"/>
           </a:p>
@@ -668,7 +676,7 @@
           <a:p>
             <a:fld id="{FE7AE501-5CD4-1C49-8470-38355E08846F}" type="datetimeFigureOut">
               <a:rPr lang="en-DE" smtClean="0"/>
-              <a:t>20.04.23</a:t>
+              <a:t>09.06.23</a:t>
             </a:fld>
             <a:endParaRPr lang="en-DE"/>
           </a:p>
@@ -868,7 +876,7 @@
           <a:p>
             <a:fld id="{FE7AE501-5CD4-1C49-8470-38355E08846F}" type="datetimeFigureOut">
               <a:rPr lang="en-DE" smtClean="0"/>
-              <a:t>20.04.23</a:t>
+              <a:t>09.06.23</a:t>
             </a:fld>
             <a:endParaRPr lang="en-DE"/>
           </a:p>
@@ -1144,7 +1152,7 @@
           <a:p>
             <a:fld id="{FE7AE501-5CD4-1C49-8470-38355E08846F}" type="datetimeFigureOut">
               <a:rPr lang="en-DE" smtClean="0"/>
-              <a:t>20.04.23</a:t>
+              <a:t>09.06.23</a:t>
             </a:fld>
             <a:endParaRPr lang="en-DE"/>
           </a:p>
@@ -1412,7 +1420,7 @@
           <a:p>
             <a:fld id="{FE7AE501-5CD4-1C49-8470-38355E08846F}" type="datetimeFigureOut">
               <a:rPr lang="en-DE" smtClean="0"/>
-              <a:t>20.04.23</a:t>
+              <a:t>09.06.23</a:t>
             </a:fld>
             <a:endParaRPr lang="en-DE"/>
           </a:p>
@@ -1827,7 +1835,7 @@
           <a:p>
             <a:fld id="{FE7AE501-5CD4-1C49-8470-38355E08846F}" type="datetimeFigureOut">
               <a:rPr lang="en-DE" smtClean="0"/>
-              <a:t>20.04.23</a:t>
+              <a:t>09.06.23</a:t>
             </a:fld>
             <a:endParaRPr lang="en-DE"/>
           </a:p>
@@ -1969,7 +1977,7 @@
           <a:p>
             <a:fld id="{FE7AE501-5CD4-1C49-8470-38355E08846F}" type="datetimeFigureOut">
               <a:rPr lang="en-DE" smtClean="0"/>
-              <a:t>20.04.23</a:t>
+              <a:t>09.06.23</a:t>
             </a:fld>
             <a:endParaRPr lang="en-DE"/>
           </a:p>
@@ -2082,7 +2090,7 @@
           <a:p>
             <a:fld id="{FE7AE501-5CD4-1C49-8470-38355E08846F}" type="datetimeFigureOut">
               <a:rPr lang="en-DE" smtClean="0"/>
-              <a:t>20.04.23</a:t>
+              <a:t>09.06.23</a:t>
             </a:fld>
             <a:endParaRPr lang="en-DE"/>
           </a:p>
@@ -2395,7 +2403,7 @@
           <a:p>
             <a:fld id="{FE7AE501-5CD4-1C49-8470-38355E08846F}" type="datetimeFigureOut">
               <a:rPr lang="en-DE" smtClean="0"/>
-              <a:t>20.04.23</a:t>
+              <a:t>09.06.23</a:t>
             </a:fld>
             <a:endParaRPr lang="en-DE"/>
           </a:p>
@@ -2684,7 +2692,7 @@
           <a:p>
             <a:fld id="{FE7AE501-5CD4-1C49-8470-38355E08846F}" type="datetimeFigureOut">
               <a:rPr lang="en-DE" smtClean="0"/>
-              <a:t>20.04.23</a:t>
+              <a:t>09.06.23</a:t>
             </a:fld>
             <a:endParaRPr lang="en-DE"/>
           </a:p>
@@ -2927,7 +2935,7 @@
           <a:p>
             <a:fld id="{FE7AE501-5CD4-1C49-8470-38355E08846F}" type="datetimeFigureOut">
               <a:rPr lang="en-DE" smtClean="0"/>
-              <a:t>20.04.23</a:t>
+              <a:t>09.06.23</a:t>
             </a:fld>
             <a:endParaRPr lang="en-DE"/>
           </a:p>
@@ -4834,6 +4842,607 @@
 </p:sld>
 </file>
 
+<file path=ppt/slides/slide4.xml><?xml version="1.0" encoding="utf-8"?>
+<p:sld xmlns:a="http://schemas.openxmlformats.org/drawingml/2006/main" xmlns:r="http://schemas.openxmlformats.org/officeDocument/2006/relationships" xmlns:p="http://schemas.openxmlformats.org/presentationml/2006/main">
+  <p:cSld>
+    <p:spTree>
+      <p:nvGrpSpPr>
+        <p:cNvPr id="1" name=""/>
+        <p:cNvGrpSpPr/>
+        <p:nvPr/>
+      </p:nvGrpSpPr>
+      <p:grpSpPr>
+        <a:xfrm>
+          <a:off x="0" y="0"/>
+          <a:ext cx="0" cy="0"/>
+          <a:chOff x="0" y="0"/>
+          <a:chExt cx="0" cy="0"/>
+        </a:xfrm>
+      </p:grpSpPr>
+      <p:sp>
+        <p:nvSpPr>
+          <p:cNvPr id="2" name="Rectangle 1">
+            <a:extLst>
+              <a:ext uri="{FF2B5EF4-FFF2-40B4-BE49-F238E27FC236}">
+                <a16:creationId xmlns:a16="http://schemas.microsoft.com/office/drawing/2014/main" id="{6D9BE74F-2507-E42D-9B30-7F552CA1CD05}"/>
+              </a:ext>
+            </a:extLst>
+          </p:cNvPr>
+          <p:cNvSpPr/>
+          <p:nvPr/>
+        </p:nvSpPr>
+        <p:spPr>
+          <a:xfrm>
+            <a:off x="3024554" y="2045970"/>
+            <a:ext cx="6142892" cy="2286000"/>
+          </a:xfrm>
+          <a:prstGeom prst="rect">
+            <a:avLst/>
+          </a:prstGeom>
+        </p:spPr>
+        <p:style>
+          <a:lnRef idx="2">
+            <a:schemeClr val="accent1">
+              <a:shade val="15000"/>
+            </a:schemeClr>
+          </a:lnRef>
+          <a:fillRef idx="1">
+            <a:schemeClr val="accent1"/>
+          </a:fillRef>
+          <a:effectRef idx="0">
+            <a:schemeClr val="accent1"/>
+          </a:effectRef>
+          <a:fontRef idx="minor">
+            <a:schemeClr val="lt1"/>
+          </a:fontRef>
+        </p:style>
+        <p:txBody>
+          <a:bodyPr rtlCol="0" anchor="ctr"/>
+          <a:lstStyle/>
+          <a:p>
+            <a:pPr algn="ctr"/>
+            <a:r>
+              <a:rPr lang="en-DE" dirty="0"/>
+              <a:t>Black box function</a:t>
+            </a:r>
+          </a:p>
+        </p:txBody>
+      </p:sp>
+      <p:sp>
+        <p:nvSpPr>
+          <p:cNvPr id="3" name="Rectangle 2">
+            <a:extLst>
+              <a:ext uri="{FF2B5EF4-FFF2-40B4-BE49-F238E27FC236}">
+                <a16:creationId xmlns:a16="http://schemas.microsoft.com/office/drawing/2014/main" id="{1DA0C7B9-E225-E716-1577-C4734788C6ED}"/>
+              </a:ext>
+            </a:extLst>
+          </p:cNvPr>
+          <p:cNvSpPr/>
+          <p:nvPr/>
+        </p:nvSpPr>
+        <p:spPr>
+          <a:xfrm>
+            <a:off x="3059723" y="3768383"/>
+            <a:ext cx="2103120" cy="480060"/>
+          </a:xfrm>
+          <a:prstGeom prst="rect">
+            <a:avLst/>
+          </a:prstGeom>
+          <a:solidFill>
+            <a:schemeClr val="accent2"/>
+          </a:solidFill>
+        </p:spPr>
+        <p:style>
+          <a:lnRef idx="2">
+            <a:schemeClr val="accent1">
+              <a:shade val="50000"/>
+            </a:schemeClr>
+          </a:lnRef>
+          <a:fillRef idx="1">
+            <a:schemeClr val="accent1"/>
+          </a:fillRef>
+          <a:effectRef idx="0">
+            <a:schemeClr val="accent1"/>
+          </a:effectRef>
+          <a:fontRef idx="minor">
+            <a:schemeClr val="lt1"/>
+          </a:fontRef>
+        </p:style>
+        <p:txBody>
+          <a:bodyPr rtlCol="0" anchor="ctr"/>
+          <a:lstStyle/>
+          <a:p>
+            <a:pPr algn="ctr"/>
+            <a:r>
+              <a:rPr lang="en-DE" dirty="0"/>
+              <a:t>Design space</a:t>
+            </a:r>
+          </a:p>
+        </p:txBody>
+      </p:sp>
+      <p:sp>
+        <p:nvSpPr>
+          <p:cNvPr id="12" name="Rectangle 11">
+            <a:extLst>
+              <a:ext uri="{FF2B5EF4-FFF2-40B4-BE49-F238E27FC236}">
+                <a16:creationId xmlns:a16="http://schemas.microsoft.com/office/drawing/2014/main" id="{76D17891-83F1-51BC-6C72-DE0F7A6AA36E}"/>
+              </a:ext>
+            </a:extLst>
+          </p:cNvPr>
+          <p:cNvSpPr/>
+          <p:nvPr/>
+        </p:nvSpPr>
+        <p:spPr>
+          <a:xfrm>
+            <a:off x="413824" y="2990557"/>
+            <a:ext cx="2103120" cy="480060"/>
+          </a:xfrm>
+          <a:prstGeom prst="rect">
+            <a:avLst/>
+          </a:prstGeom>
+          <a:solidFill>
+            <a:schemeClr val="accent2"/>
+          </a:solidFill>
+        </p:spPr>
+        <p:style>
+          <a:lnRef idx="2">
+            <a:schemeClr val="accent1">
+              <a:shade val="50000"/>
+            </a:schemeClr>
+          </a:lnRef>
+          <a:fillRef idx="1">
+            <a:schemeClr val="accent1"/>
+          </a:fillRef>
+          <a:effectRef idx="0">
+            <a:schemeClr val="accent1"/>
+          </a:effectRef>
+          <a:fontRef idx="minor">
+            <a:schemeClr val="lt1"/>
+          </a:fontRef>
+        </p:style>
+        <p:txBody>
+          <a:bodyPr rtlCol="0" anchor="ctr"/>
+          <a:lstStyle/>
+          <a:p>
+            <a:pPr algn="ctr"/>
+            <a:r>
+              <a:rPr lang="en-DE" dirty="0"/>
+              <a:t>Input</a:t>
+            </a:r>
+          </a:p>
+        </p:txBody>
+      </p:sp>
+      <p:sp>
+        <p:nvSpPr>
+          <p:cNvPr id="13" name="Rectangle 12">
+            <a:extLst>
+              <a:ext uri="{FF2B5EF4-FFF2-40B4-BE49-F238E27FC236}">
+                <a16:creationId xmlns:a16="http://schemas.microsoft.com/office/drawing/2014/main" id="{C19347B7-A573-03B7-6FCA-FD3B786F9464}"/>
+              </a:ext>
+            </a:extLst>
+          </p:cNvPr>
+          <p:cNvSpPr/>
+          <p:nvPr/>
+        </p:nvSpPr>
+        <p:spPr>
+          <a:xfrm>
+            <a:off x="9675056" y="2948940"/>
+            <a:ext cx="2103120" cy="480060"/>
+          </a:xfrm>
+          <a:prstGeom prst="rect">
+            <a:avLst/>
+          </a:prstGeom>
+          <a:solidFill>
+            <a:schemeClr val="accent2"/>
+          </a:solidFill>
+        </p:spPr>
+        <p:style>
+          <a:lnRef idx="2">
+            <a:schemeClr val="accent1">
+              <a:shade val="50000"/>
+            </a:schemeClr>
+          </a:lnRef>
+          <a:fillRef idx="1">
+            <a:schemeClr val="accent1"/>
+          </a:fillRef>
+          <a:effectRef idx="0">
+            <a:schemeClr val="accent1"/>
+          </a:effectRef>
+          <a:fontRef idx="minor">
+            <a:schemeClr val="lt1"/>
+          </a:fontRef>
+        </p:style>
+        <p:txBody>
+          <a:bodyPr rtlCol="0" anchor="ctr"/>
+          <a:lstStyle/>
+          <a:p>
+            <a:pPr algn="ctr"/>
+            <a:r>
+              <a:rPr lang="en-DE" dirty="0"/>
+              <a:t>Pareto reflection </a:t>
+            </a:r>
+          </a:p>
+        </p:txBody>
+      </p:sp>
+    </p:spTree>
+    <p:extLst>
+      <p:ext uri="{BB962C8B-B14F-4D97-AF65-F5344CB8AC3E}">
+        <p14:creationId xmlns:p14="http://schemas.microsoft.com/office/powerpoint/2010/main" val="1334560398"/>
+      </p:ext>
+    </p:extLst>
+  </p:cSld>
+  <p:clrMapOvr>
+    <a:masterClrMapping/>
+  </p:clrMapOvr>
+</p:sld>
+</file>
+
+<file path=ppt/slides/slide5.xml><?xml version="1.0" encoding="utf-8"?>
+<p:sld xmlns:a="http://schemas.openxmlformats.org/drawingml/2006/main" xmlns:r="http://schemas.openxmlformats.org/officeDocument/2006/relationships" xmlns:p="http://schemas.openxmlformats.org/presentationml/2006/main">
+  <p:cSld>
+    <p:spTree>
+      <p:nvGrpSpPr>
+        <p:cNvPr id="1" name=""/>
+        <p:cNvGrpSpPr/>
+        <p:nvPr/>
+      </p:nvGrpSpPr>
+      <p:grpSpPr>
+        <a:xfrm>
+          <a:off x="0" y="0"/>
+          <a:ext cx="0" cy="0"/>
+          <a:chOff x="0" y="0"/>
+          <a:chExt cx="0" cy="0"/>
+        </a:xfrm>
+      </p:grpSpPr>
+      <p:sp>
+        <p:nvSpPr>
+          <p:cNvPr id="2" name="Rectangle 1">
+            <a:extLst>
+              <a:ext uri="{FF2B5EF4-FFF2-40B4-BE49-F238E27FC236}">
+                <a16:creationId xmlns:a16="http://schemas.microsoft.com/office/drawing/2014/main" id="{6D9BE74F-2507-E42D-9B30-7F552CA1CD05}"/>
+              </a:ext>
+            </a:extLst>
+          </p:cNvPr>
+          <p:cNvSpPr/>
+          <p:nvPr/>
+        </p:nvSpPr>
+        <p:spPr>
+          <a:xfrm>
+            <a:off x="3024554" y="2045970"/>
+            <a:ext cx="6142892" cy="2286000"/>
+          </a:xfrm>
+          <a:prstGeom prst="rect">
+            <a:avLst/>
+          </a:prstGeom>
+        </p:spPr>
+        <p:style>
+          <a:lnRef idx="2">
+            <a:schemeClr val="accent1">
+              <a:shade val="15000"/>
+            </a:schemeClr>
+          </a:lnRef>
+          <a:fillRef idx="1">
+            <a:schemeClr val="accent1"/>
+          </a:fillRef>
+          <a:effectRef idx="0">
+            <a:schemeClr val="accent1"/>
+          </a:effectRef>
+          <a:fontRef idx="minor">
+            <a:schemeClr val="lt1"/>
+          </a:fontRef>
+        </p:style>
+        <p:txBody>
+          <a:bodyPr rtlCol="0" anchor="ctr"/>
+          <a:lstStyle/>
+          <a:p>
+            <a:pPr algn="ctr"/>
+            <a:r>
+              <a:rPr lang="en-DE" dirty="0"/>
+              <a:t>MOO algorithm</a:t>
+            </a:r>
+          </a:p>
+        </p:txBody>
+      </p:sp>
+      <p:sp>
+        <p:nvSpPr>
+          <p:cNvPr id="12" name="Rectangle 11">
+            <a:extLst>
+              <a:ext uri="{FF2B5EF4-FFF2-40B4-BE49-F238E27FC236}">
+                <a16:creationId xmlns:a16="http://schemas.microsoft.com/office/drawing/2014/main" id="{76D17891-83F1-51BC-6C72-DE0F7A6AA36E}"/>
+              </a:ext>
+            </a:extLst>
+          </p:cNvPr>
+          <p:cNvSpPr/>
+          <p:nvPr/>
+        </p:nvSpPr>
+        <p:spPr>
+          <a:xfrm>
+            <a:off x="413824" y="2990557"/>
+            <a:ext cx="2103120" cy="480060"/>
+          </a:xfrm>
+          <a:prstGeom prst="rect">
+            <a:avLst/>
+          </a:prstGeom>
+          <a:solidFill>
+            <a:schemeClr val="accent2"/>
+          </a:solidFill>
+        </p:spPr>
+        <p:style>
+          <a:lnRef idx="2">
+            <a:schemeClr val="accent1">
+              <a:shade val="50000"/>
+            </a:schemeClr>
+          </a:lnRef>
+          <a:fillRef idx="1">
+            <a:schemeClr val="accent1"/>
+          </a:fillRef>
+          <a:effectRef idx="0">
+            <a:schemeClr val="accent1"/>
+          </a:effectRef>
+          <a:fontRef idx="minor">
+            <a:schemeClr val="lt1"/>
+          </a:fontRef>
+        </p:style>
+        <p:txBody>
+          <a:bodyPr rtlCol="0" anchor="ctr"/>
+          <a:lstStyle/>
+          <a:p>
+            <a:pPr algn="ctr"/>
+            <a:r>
+              <a:rPr lang="en-DE" dirty="0"/>
+              <a:t>Blackbox function</a:t>
+            </a:r>
+          </a:p>
+        </p:txBody>
+      </p:sp>
+      <p:sp>
+        <p:nvSpPr>
+          <p:cNvPr id="4" name="Rectangle 3">
+            <a:extLst>
+              <a:ext uri="{FF2B5EF4-FFF2-40B4-BE49-F238E27FC236}">
+                <a16:creationId xmlns:a16="http://schemas.microsoft.com/office/drawing/2014/main" id="{5ABEA110-1F2A-D61B-D89D-E4BF45E08BA9}"/>
+              </a:ext>
+            </a:extLst>
+          </p:cNvPr>
+          <p:cNvSpPr/>
+          <p:nvPr/>
+        </p:nvSpPr>
+        <p:spPr>
+          <a:xfrm>
+            <a:off x="9569547" y="2990557"/>
+            <a:ext cx="2103120" cy="480060"/>
+          </a:xfrm>
+          <a:prstGeom prst="rect">
+            <a:avLst/>
+          </a:prstGeom>
+          <a:solidFill>
+            <a:schemeClr val="accent2"/>
+          </a:solidFill>
+        </p:spPr>
+        <p:style>
+          <a:lnRef idx="2">
+            <a:schemeClr val="accent1">
+              <a:shade val="50000"/>
+            </a:schemeClr>
+          </a:lnRef>
+          <a:fillRef idx="1">
+            <a:schemeClr val="accent1"/>
+          </a:fillRef>
+          <a:effectRef idx="0">
+            <a:schemeClr val="accent1"/>
+          </a:effectRef>
+          <a:fontRef idx="minor">
+            <a:schemeClr val="lt1"/>
+          </a:fontRef>
+        </p:style>
+        <p:txBody>
+          <a:bodyPr rtlCol="0" anchor="ctr"/>
+          <a:lstStyle/>
+          <a:p>
+            <a:pPr algn="ctr"/>
+            <a:r>
+              <a:rPr lang="en-DE" dirty="0"/>
+              <a:t>Blackbox function</a:t>
+            </a:r>
+          </a:p>
+        </p:txBody>
+      </p:sp>
+    </p:spTree>
+    <p:extLst>
+      <p:ext uri="{BB962C8B-B14F-4D97-AF65-F5344CB8AC3E}">
+        <p14:creationId xmlns:p14="http://schemas.microsoft.com/office/powerpoint/2010/main" val="1947170939"/>
+      </p:ext>
+    </p:extLst>
+  </p:cSld>
+  <p:clrMapOvr>
+    <a:masterClrMapping/>
+  </p:clrMapOvr>
+</p:sld>
+</file>
+
+<file path=ppt/slides/slide6.xml><?xml version="1.0" encoding="utf-8"?>
+<p:sld xmlns:a="http://schemas.openxmlformats.org/drawingml/2006/main" xmlns:r="http://schemas.openxmlformats.org/officeDocument/2006/relationships" xmlns:p="http://schemas.openxmlformats.org/presentationml/2006/main">
+  <p:cSld>
+    <p:spTree>
+      <p:nvGrpSpPr>
+        <p:cNvPr id="1" name=""/>
+        <p:cNvGrpSpPr/>
+        <p:nvPr/>
+      </p:nvGrpSpPr>
+      <p:grpSpPr>
+        <a:xfrm>
+          <a:off x="0" y="0"/>
+          <a:ext cx="0" cy="0"/>
+          <a:chOff x="0" y="0"/>
+          <a:chExt cx="0" cy="0"/>
+        </a:xfrm>
+      </p:grpSpPr>
+      <p:sp>
+        <p:nvSpPr>
+          <p:cNvPr id="2" name="Rectangle 1">
+            <a:extLst>
+              <a:ext uri="{FF2B5EF4-FFF2-40B4-BE49-F238E27FC236}">
+                <a16:creationId xmlns:a16="http://schemas.microsoft.com/office/drawing/2014/main" id="{6D9BE74F-2507-E42D-9B30-7F552CA1CD05}"/>
+              </a:ext>
+            </a:extLst>
+          </p:cNvPr>
+          <p:cNvSpPr/>
+          <p:nvPr/>
+        </p:nvSpPr>
+        <p:spPr>
+          <a:xfrm>
+            <a:off x="3024554" y="2045970"/>
+            <a:ext cx="6142892" cy="2286000"/>
+          </a:xfrm>
+          <a:prstGeom prst="rect">
+            <a:avLst/>
+          </a:prstGeom>
+        </p:spPr>
+        <p:style>
+          <a:lnRef idx="2">
+            <a:schemeClr val="accent1">
+              <a:shade val="15000"/>
+            </a:schemeClr>
+          </a:lnRef>
+          <a:fillRef idx="1">
+            <a:schemeClr val="accent1"/>
+          </a:fillRef>
+          <a:effectRef idx="0">
+            <a:schemeClr val="accent1"/>
+          </a:effectRef>
+          <a:fontRef idx="minor">
+            <a:schemeClr val="lt1"/>
+          </a:fontRef>
+        </p:style>
+        <p:txBody>
+          <a:bodyPr rtlCol="0" anchor="ctr"/>
+          <a:lstStyle/>
+          <a:p>
+            <a:pPr algn="ctr"/>
+            <a:r>
+              <a:rPr lang="en-DE" dirty="0"/>
+              <a:t>MOO algorithm</a:t>
+            </a:r>
+          </a:p>
+        </p:txBody>
+      </p:sp>
+      <p:sp>
+        <p:nvSpPr>
+          <p:cNvPr id="12" name="Rectangle 11">
+            <a:extLst>
+              <a:ext uri="{FF2B5EF4-FFF2-40B4-BE49-F238E27FC236}">
+                <a16:creationId xmlns:a16="http://schemas.microsoft.com/office/drawing/2014/main" id="{76D17891-83F1-51BC-6C72-DE0F7A6AA36E}"/>
+              </a:ext>
+            </a:extLst>
+          </p:cNvPr>
+          <p:cNvSpPr/>
+          <p:nvPr/>
+        </p:nvSpPr>
+        <p:spPr>
+          <a:xfrm>
+            <a:off x="413824" y="2990557"/>
+            <a:ext cx="2103120" cy="480060"/>
+          </a:xfrm>
+          <a:prstGeom prst="rect">
+            <a:avLst/>
+          </a:prstGeom>
+          <a:solidFill>
+            <a:schemeClr val="accent2"/>
+          </a:solidFill>
+        </p:spPr>
+        <p:style>
+          <a:lnRef idx="2">
+            <a:schemeClr val="accent1">
+              <a:shade val="50000"/>
+            </a:schemeClr>
+          </a:lnRef>
+          <a:fillRef idx="1">
+            <a:schemeClr val="accent1"/>
+          </a:fillRef>
+          <a:effectRef idx="0">
+            <a:schemeClr val="accent1"/>
+          </a:effectRef>
+          <a:fontRef idx="minor">
+            <a:schemeClr val="lt1"/>
+          </a:fontRef>
+        </p:style>
+        <p:txBody>
+          <a:bodyPr rtlCol="0" anchor="ctr"/>
+          <a:lstStyle/>
+          <a:p>
+            <a:pPr algn="ctr"/>
+            <a:r>
+              <a:rPr lang="en-DE" dirty="0"/>
+              <a:t>Blackbox function</a:t>
+            </a:r>
+          </a:p>
+        </p:txBody>
+      </p:sp>
+      <p:sp>
+        <p:nvSpPr>
+          <p:cNvPr id="4" name="Rectangle 3">
+            <a:extLst>
+              <a:ext uri="{FF2B5EF4-FFF2-40B4-BE49-F238E27FC236}">
+                <a16:creationId xmlns:a16="http://schemas.microsoft.com/office/drawing/2014/main" id="{5ABEA110-1F2A-D61B-D89D-E4BF45E08BA9}"/>
+              </a:ext>
+            </a:extLst>
+          </p:cNvPr>
+          <p:cNvSpPr/>
+          <p:nvPr/>
+        </p:nvSpPr>
+        <p:spPr>
+          <a:xfrm>
+            <a:off x="9569547" y="2990557"/>
+            <a:ext cx="2103120" cy="480060"/>
+          </a:xfrm>
+          <a:prstGeom prst="rect">
+            <a:avLst/>
+          </a:prstGeom>
+          <a:solidFill>
+            <a:schemeClr val="accent2"/>
+          </a:solidFill>
+        </p:spPr>
+        <p:style>
+          <a:lnRef idx="2">
+            <a:schemeClr val="accent1">
+              <a:shade val="50000"/>
+            </a:schemeClr>
+          </a:lnRef>
+          <a:fillRef idx="1">
+            <a:schemeClr val="accent1"/>
+          </a:fillRef>
+          <a:effectRef idx="0">
+            <a:schemeClr val="accent1"/>
+          </a:effectRef>
+          <a:fontRef idx="minor">
+            <a:schemeClr val="lt1"/>
+          </a:fontRef>
+        </p:style>
+        <p:txBody>
+          <a:bodyPr rtlCol="0" anchor="ctr"/>
+          <a:lstStyle/>
+          <a:p>
+            <a:pPr algn="ctr"/>
+            <a:r>
+              <a:rPr lang="en-DE" dirty="0"/>
+              <a:t>Blackbox function</a:t>
+            </a:r>
+          </a:p>
+        </p:txBody>
+      </p:sp>
+    </p:spTree>
+    <p:extLst>
+      <p:ext uri="{BB962C8B-B14F-4D97-AF65-F5344CB8AC3E}">
+        <p14:creationId xmlns:p14="http://schemas.microsoft.com/office/powerpoint/2010/main" val="20357626"/>
+      </p:ext>
+    </p:extLst>
+  </p:cSld>
+  <p:clrMapOvr>
+    <a:masterClrMapping/>
+  </p:clrMapOvr>
+</p:sld>
+</file>
+
 <file path=ppt/theme/theme1.xml><?xml version="1.0" encoding="utf-8"?>
 <a:theme xmlns:a="http://schemas.openxmlformats.org/drawingml/2006/main" name="Office Theme">
   <a:themeElements>

</xml_diff>